<commit_message>
Updated image of Model Class Diagram
</commit_message>
<xml_diff>
--- a/docs/diagrams/ModelComponentClassDiagram.pptx
+++ b/docs/diagrams/ModelComponentClassDiagram.pptx
@@ -6557,12 +6557,12 @@
         </p:nvCxnSpPr>
         <p:spPr>
           <a:xfrm rot="16200000" flipV="1">
-            <a:off x="6305321" y="3375696"/>
-            <a:ext cx="1721559" cy="1358148"/>
+            <a:off x="6279261" y="3401758"/>
+            <a:ext cx="1742867" cy="1327334"/>
           </a:xfrm>
           <a:prstGeom prst="bentConnector3">
             <a:avLst>
-              <a:gd name="adj1" fmla="val 37534"/>
+              <a:gd name="adj1" fmla="val 38757"/>
             </a:avLst>
           </a:prstGeom>
           <a:ln w="19050">

</xml_diff>